<commit_message>
updates from Bella notes in MS
</commit_message>
<xml_diff>
--- a/Figures/snowpack format.pptx
+++ b/Figures/snowpack format.pptx
@@ -259,7 +259,7 @@
           <a:p>
             <a:fld id="{1B8DEB53-FEBF-4E64-8665-BB8D6887B918}" type="datetimeFigureOut">
               <a:rPr lang="en-US" smtClean="0"/>
-              <a:t>3/10/2024</a:t>
+              <a:t>4/16/2024</a:t>
             </a:fld>
             <a:endParaRPr lang="en-US"/>
           </a:p>
@@ -457,7 +457,7 @@
           <a:p>
             <a:fld id="{1B8DEB53-FEBF-4E64-8665-BB8D6887B918}" type="datetimeFigureOut">
               <a:rPr lang="en-US" smtClean="0"/>
-              <a:t>3/10/2024</a:t>
+              <a:t>4/16/2024</a:t>
             </a:fld>
             <a:endParaRPr lang="en-US"/>
           </a:p>
@@ -665,7 +665,7 @@
           <a:p>
             <a:fld id="{1B8DEB53-FEBF-4E64-8665-BB8D6887B918}" type="datetimeFigureOut">
               <a:rPr lang="en-US" smtClean="0"/>
-              <a:t>3/10/2024</a:t>
+              <a:t>4/16/2024</a:t>
             </a:fld>
             <a:endParaRPr lang="en-US"/>
           </a:p>
@@ -863,7 +863,7 @@
           <a:p>
             <a:fld id="{1B8DEB53-FEBF-4E64-8665-BB8D6887B918}" type="datetimeFigureOut">
               <a:rPr lang="en-US" smtClean="0"/>
-              <a:t>3/10/2024</a:t>
+              <a:t>4/16/2024</a:t>
             </a:fld>
             <a:endParaRPr lang="en-US"/>
           </a:p>
@@ -1138,7 +1138,7 @@
           <a:p>
             <a:fld id="{1B8DEB53-FEBF-4E64-8665-BB8D6887B918}" type="datetimeFigureOut">
               <a:rPr lang="en-US" smtClean="0"/>
-              <a:t>3/10/2024</a:t>
+              <a:t>4/16/2024</a:t>
             </a:fld>
             <a:endParaRPr lang="en-US"/>
           </a:p>
@@ -1403,7 +1403,7 @@
           <a:p>
             <a:fld id="{1B8DEB53-FEBF-4E64-8665-BB8D6887B918}" type="datetimeFigureOut">
               <a:rPr lang="en-US" smtClean="0"/>
-              <a:t>3/10/2024</a:t>
+              <a:t>4/16/2024</a:t>
             </a:fld>
             <a:endParaRPr lang="en-US"/>
           </a:p>
@@ -1815,7 +1815,7 @@
           <a:p>
             <a:fld id="{1B8DEB53-FEBF-4E64-8665-BB8D6887B918}" type="datetimeFigureOut">
               <a:rPr lang="en-US" smtClean="0"/>
-              <a:t>3/10/2024</a:t>
+              <a:t>4/16/2024</a:t>
             </a:fld>
             <a:endParaRPr lang="en-US"/>
           </a:p>
@@ -1956,7 +1956,7 @@
           <a:p>
             <a:fld id="{1B8DEB53-FEBF-4E64-8665-BB8D6887B918}" type="datetimeFigureOut">
               <a:rPr lang="en-US" smtClean="0"/>
-              <a:t>3/10/2024</a:t>
+              <a:t>4/16/2024</a:t>
             </a:fld>
             <a:endParaRPr lang="en-US"/>
           </a:p>
@@ -2069,7 +2069,7 @@
           <a:p>
             <a:fld id="{1B8DEB53-FEBF-4E64-8665-BB8D6887B918}" type="datetimeFigureOut">
               <a:rPr lang="en-US" smtClean="0"/>
-              <a:t>3/10/2024</a:t>
+              <a:t>4/16/2024</a:t>
             </a:fld>
             <a:endParaRPr lang="en-US"/>
           </a:p>
@@ -2380,7 +2380,7 @@
           <a:p>
             <a:fld id="{1B8DEB53-FEBF-4E64-8665-BB8D6887B918}" type="datetimeFigureOut">
               <a:rPr lang="en-US" smtClean="0"/>
-              <a:t>3/10/2024</a:t>
+              <a:t>4/16/2024</a:t>
             </a:fld>
             <a:endParaRPr lang="en-US"/>
           </a:p>
@@ -2668,7 +2668,7 @@
           <a:p>
             <a:fld id="{1B8DEB53-FEBF-4E64-8665-BB8D6887B918}" type="datetimeFigureOut">
               <a:rPr lang="en-US" smtClean="0"/>
-              <a:t>3/10/2024</a:t>
+              <a:t>4/16/2024</a:t>
             </a:fld>
             <a:endParaRPr lang="en-US"/>
           </a:p>
@@ -2909,7 +2909,7 @@
           <a:p>
             <a:fld id="{1B8DEB53-FEBF-4E64-8665-BB8D6887B918}" type="datetimeFigureOut">
               <a:rPr lang="en-US" smtClean="0"/>
-              <a:t>3/10/2024</a:t>
+              <a:t>4/16/2024</a:t>
             </a:fld>
             <a:endParaRPr lang="en-US"/>
           </a:p>
@@ -3416,7 +3416,7 @@
                   <a:latin typeface="Times New Roman" panose="02020603050405020304" pitchFamily="18" charset="0"/>
                   <a:cs typeface="Times New Roman" panose="02020603050405020304" pitchFamily="18" charset="0"/>
                 </a:rPr>
-                <a:t>Annual snowpack (m)</a:t>
+                <a:t>Annual snow depth (m)</a:t>
               </a:r>
             </a:p>
           </p:txBody>
@@ -3731,6 +3731,23 @@
 </file>
 
 <file path=customXml/item1.xml><?xml version="1.0" encoding="utf-8"?>
+<p:properties xmlns:p="http://schemas.microsoft.com/office/2006/metadata/properties" xmlns:xsi="http://www.w3.org/2001/XMLSchema-instance" xmlns:pc="http://schemas.microsoft.com/office/infopath/2007/PartnerControls">
+  <documentManagement>
+    <_activity xmlns="95795a71-e404-4875-a540-02ae73fec679" xsi:nil="true"/>
+  </documentManagement>
+</p:properties>
+</file>
+
+<file path=customXml/item2.xml><?xml version="1.0" encoding="utf-8"?>
+<?mso-contentType ?>
+<FormTemplates xmlns="http://schemas.microsoft.com/sharepoint/v3/contenttype/forms">
+  <Display>DocumentLibraryForm</Display>
+  <Edit>DocumentLibraryForm</Edit>
+  <New>DocumentLibraryForm</New>
+</FormTemplates>
+</file>
+
+<file path=customXml/item3.xml><?xml version="1.0" encoding="utf-8"?>
 <ct:contentTypeSchema xmlns:ct="http://schemas.microsoft.com/office/2006/metadata/contentType" xmlns:ma="http://schemas.microsoft.com/office/2006/metadata/properties/metaAttributes" ct:_="" ma:_="" ma:contentTypeName="Document" ma:contentTypeID="0x010100063939A63737AC47B8C69DF635FB413A" ma:contentTypeVersion="18" ma:contentTypeDescription="Create a new document." ma:contentTypeScope="" ma:versionID="3f2a235765a2cd8897205e316b1fe830">
   <xsd:schema xmlns:xsd="http://www.w3.org/2001/XMLSchema" xmlns:xs="http://www.w3.org/2001/XMLSchema" xmlns:p="http://schemas.microsoft.com/office/2006/metadata/properties" xmlns:ns3="95795a71-e404-4875-a540-02ae73fec679" xmlns:ns4="050f8cba-7fe8-4dfb-a19a-871d44564048" targetNamespace="http://schemas.microsoft.com/office/2006/metadata/properties" ma:root="true" ma:fieldsID="54520240dade0c44c3d2c79203a76902" ns3:_="" ns4:_="">
     <xsd:import namespace="95795a71-e404-4875-a540-02ae73fec679"/>
@@ -3983,24 +4000,32 @@
 </ct:contentTypeSchema>
 </file>
 
-<file path=customXml/item2.xml><?xml version="1.0" encoding="utf-8"?>
-<?mso-contentType ?>
-<FormTemplates xmlns="http://schemas.microsoft.com/sharepoint/v3/contenttype/forms">
-  <Display>DocumentLibraryForm</Display>
-  <Edit>DocumentLibraryForm</Edit>
-  <New>DocumentLibraryForm</New>
-</FormTemplates>
+<file path=customXml/itemProps1.xml><?xml version="1.0" encoding="utf-8"?>
+<ds:datastoreItem xmlns:ds="http://schemas.openxmlformats.org/officeDocument/2006/customXml" ds:itemID="{B44DE52A-ED12-4387-A128-BD08EB064083}">
+  <ds:schemaRefs>
+    <ds:schemaRef ds:uri="http://schemas.microsoft.com/office/2006/documentManagement/types"/>
+    <ds:schemaRef ds:uri="95795a71-e404-4875-a540-02ae73fec679"/>
+    <ds:schemaRef ds:uri="http://www.w3.org/XML/1998/namespace"/>
+    <ds:schemaRef ds:uri="http://schemas.microsoft.com/office/2006/metadata/properties"/>
+    <ds:schemaRef ds:uri="050f8cba-7fe8-4dfb-a19a-871d44564048"/>
+    <ds:schemaRef ds:uri="http://purl.org/dc/dcmitype/"/>
+    <ds:schemaRef ds:uri="http://purl.org/dc/elements/1.1/"/>
+    <ds:schemaRef ds:uri="http://schemas.microsoft.com/office/infopath/2007/PartnerControls"/>
+    <ds:schemaRef ds:uri="http://schemas.openxmlformats.org/package/2006/metadata/core-properties"/>
+    <ds:schemaRef ds:uri="http://purl.org/dc/terms/"/>
+  </ds:schemaRefs>
+</ds:datastoreItem>
 </file>
 
-<file path=customXml/item3.xml><?xml version="1.0" encoding="utf-8"?>
-<p:properties xmlns:p="http://schemas.microsoft.com/office/2006/metadata/properties" xmlns:xsi="http://www.w3.org/2001/XMLSchema-instance" xmlns:pc="http://schemas.microsoft.com/office/infopath/2007/PartnerControls">
-  <documentManagement>
-    <_activity xmlns="95795a71-e404-4875-a540-02ae73fec679" xsi:nil="true"/>
-  </documentManagement>
-</p:properties>
+<file path=customXml/itemProps2.xml><?xml version="1.0" encoding="utf-8"?>
+<ds:datastoreItem xmlns:ds="http://schemas.openxmlformats.org/officeDocument/2006/customXml" ds:itemID="{46EC44A2-D96C-4956-A631-1C22B9C98064}">
+  <ds:schemaRefs>
+    <ds:schemaRef ds:uri="http://schemas.microsoft.com/sharepoint/v3/contenttype/forms"/>
+  </ds:schemaRefs>
+</ds:datastoreItem>
 </file>
 
-<file path=customXml/itemProps1.xml><?xml version="1.0" encoding="utf-8"?>
+<file path=customXml/itemProps3.xml><?xml version="1.0" encoding="utf-8"?>
 <ds:datastoreItem xmlns:ds="http://schemas.openxmlformats.org/officeDocument/2006/customXml" ds:itemID="{218150A7-2B05-4602-B3DE-5EC64380C3D8}">
   <ds:schemaRefs>
     <ds:schemaRef ds:uri="http://schemas.microsoft.com/office/2006/metadata/contentType"/>
@@ -4017,29 +4042,4 @@
     <ds:schemaRef ds:uri="http://schemas.microsoft.com/internal/obd"/>
   </ds:schemaRefs>
 </ds:datastoreItem>
-</file>
-
-<file path=customXml/itemProps2.xml><?xml version="1.0" encoding="utf-8"?>
-<ds:datastoreItem xmlns:ds="http://schemas.openxmlformats.org/officeDocument/2006/customXml" ds:itemID="{46EC44A2-D96C-4956-A631-1C22B9C98064}">
-  <ds:schemaRefs>
-    <ds:schemaRef ds:uri="http://schemas.microsoft.com/sharepoint/v3/contenttype/forms"/>
-  </ds:schemaRefs>
-</ds:datastoreItem>
-</file>
-
-<file path=customXml/itemProps3.xml><?xml version="1.0" encoding="utf-8"?>
-<ds:datastoreItem xmlns:ds="http://schemas.openxmlformats.org/officeDocument/2006/customXml" ds:itemID="{B44DE52A-ED12-4387-A128-BD08EB064083}">
-  <ds:schemaRefs>
-    <ds:schemaRef ds:uri="http://schemas.microsoft.com/office/2006/documentManagement/types"/>
-    <ds:schemaRef ds:uri="95795a71-e404-4875-a540-02ae73fec679"/>
-    <ds:schemaRef ds:uri="http://www.w3.org/XML/1998/namespace"/>
-    <ds:schemaRef ds:uri="http://schemas.microsoft.com/office/2006/metadata/properties"/>
-    <ds:schemaRef ds:uri="050f8cba-7fe8-4dfb-a19a-871d44564048"/>
-    <ds:schemaRef ds:uri="http://purl.org/dc/dcmitype/"/>
-    <ds:schemaRef ds:uri="http://purl.org/dc/elements/1.1/"/>
-    <ds:schemaRef ds:uri="http://schemas.microsoft.com/office/infopath/2007/PartnerControls"/>
-    <ds:schemaRef ds:uri="http://schemas.openxmlformats.org/package/2006/metadata/core-properties"/>
-    <ds:schemaRef ds:uri="http://purl.org/dc/terms/"/>
-  </ds:schemaRefs>
-</ds:datastoreItem>
 </file>
</xml_diff>

<commit_message>
changed snowpack to SWE for all plots
</commit_message>
<xml_diff>
--- a/Figures/snowpack format.pptx
+++ b/Figures/snowpack format.pptx
@@ -259,7 +259,7 @@
           <a:p>
             <a:fld id="{1B8DEB53-FEBF-4E64-8665-BB8D6887B918}" type="datetimeFigureOut">
               <a:rPr lang="en-US" smtClean="0"/>
-              <a:t>4/16/2024</a:t>
+              <a:t>6/10/2024</a:t>
             </a:fld>
             <a:endParaRPr lang="en-US"/>
           </a:p>
@@ -457,7 +457,7 @@
           <a:p>
             <a:fld id="{1B8DEB53-FEBF-4E64-8665-BB8D6887B918}" type="datetimeFigureOut">
               <a:rPr lang="en-US" smtClean="0"/>
-              <a:t>4/16/2024</a:t>
+              <a:t>6/10/2024</a:t>
             </a:fld>
             <a:endParaRPr lang="en-US"/>
           </a:p>
@@ -665,7 +665,7 @@
           <a:p>
             <a:fld id="{1B8DEB53-FEBF-4E64-8665-BB8D6887B918}" type="datetimeFigureOut">
               <a:rPr lang="en-US" smtClean="0"/>
-              <a:t>4/16/2024</a:t>
+              <a:t>6/10/2024</a:t>
             </a:fld>
             <a:endParaRPr lang="en-US"/>
           </a:p>
@@ -863,7 +863,7 @@
           <a:p>
             <a:fld id="{1B8DEB53-FEBF-4E64-8665-BB8D6887B918}" type="datetimeFigureOut">
               <a:rPr lang="en-US" smtClean="0"/>
-              <a:t>4/16/2024</a:t>
+              <a:t>6/10/2024</a:t>
             </a:fld>
             <a:endParaRPr lang="en-US"/>
           </a:p>
@@ -1138,7 +1138,7 @@
           <a:p>
             <a:fld id="{1B8DEB53-FEBF-4E64-8665-BB8D6887B918}" type="datetimeFigureOut">
               <a:rPr lang="en-US" smtClean="0"/>
-              <a:t>4/16/2024</a:t>
+              <a:t>6/10/2024</a:t>
             </a:fld>
             <a:endParaRPr lang="en-US"/>
           </a:p>
@@ -1403,7 +1403,7 @@
           <a:p>
             <a:fld id="{1B8DEB53-FEBF-4E64-8665-BB8D6887B918}" type="datetimeFigureOut">
               <a:rPr lang="en-US" smtClean="0"/>
-              <a:t>4/16/2024</a:t>
+              <a:t>6/10/2024</a:t>
             </a:fld>
             <a:endParaRPr lang="en-US"/>
           </a:p>
@@ -1815,7 +1815,7 @@
           <a:p>
             <a:fld id="{1B8DEB53-FEBF-4E64-8665-BB8D6887B918}" type="datetimeFigureOut">
               <a:rPr lang="en-US" smtClean="0"/>
-              <a:t>4/16/2024</a:t>
+              <a:t>6/10/2024</a:t>
             </a:fld>
             <a:endParaRPr lang="en-US"/>
           </a:p>
@@ -1956,7 +1956,7 @@
           <a:p>
             <a:fld id="{1B8DEB53-FEBF-4E64-8665-BB8D6887B918}" type="datetimeFigureOut">
               <a:rPr lang="en-US" smtClean="0"/>
-              <a:t>4/16/2024</a:t>
+              <a:t>6/10/2024</a:t>
             </a:fld>
             <a:endParaRPr lang="en-US"/>
           </a:p>
@@ -2069,7 +2069,7 @@
           <a:p>
             <a:fld id="{1B8DEB53-FEBF-4E64-8665-BB8D6887B918}" type="datetimeFigureOut">
               <a:rPr lang="en-US" smtClean="0"/>
-              <a:t>4/16/2024</a:t>
+              <a:t>6/10/2024</a:t>
             </a:fld>
             <a:endParaRPr lang="en-US"/>
           </a:p>
@@ -2380,7 +2380,7 @@
           <a:p>
             <a:fld id="{1B8DEB53-FEBF-4E64-8665-BB8D6887B918}" type="datetimeFigureOut">
               <a:rPr lang="en-US" smtClean="0"/>
-              <a:t>4/16/2024</a:t>
+              <a:t>6/10/2024</a:t>
             </a:fld>
             <a:endParaRPr lang="en-US"/>
           </a:p>
@@ -2668,7 +2668,7 @@
           <a:p>
             <a:fld id="{1B8DEB53-FEBF-4E64-8665-BB8D6887B918}" type="datetimeFigureOut">
               <a:rPr lang="en-US" smtClean="0"/>
-              <a:t>4/16/2024</a:t>
+              <a:t>6/10/2024</a:t>
             </a:fld>
             <a:endParaRPr lang="en-US"/>
           </a:p>
@@ -2909,7 +2909,7 @@
           <a:p>
             <a:fld id="{1B8DEB53-FEBF-4E64-8665-BB8D6887B918}" type="datetimeFigureOut">
               <a:rPr lang="en-US" smtClean="0"/>
-              <a:t>4/16/2024</a:t>
+              <a:t>6/10/2024</a:t>
             </a:fld>
             <a:endParaRPr lang="en-US"/>
           </a:p>
@@ -3416,7 +3416,21 @@
                   <a:latin typeface="Times New Roman" panose="02020603050405020304" pitchFamily="18" charset="0"/>
                   <a:cs typeface="Times New Roman" panose="02020603050405020304" pitchFamily="18" charset="0"/>
                 </a:rPr>
-                <a:t>Annual snow depth (m)</a:t>
+                <a:t>Annual SWE (kg m</a:t>
+              </a:r>
+              <a:r>
+                <a:rPr lang="en-US" sz="1100" baseline="30000" dirty="0">
+                  <a:latin typeface="Times New Roman" panose="02020603050405020304" pitchFamily="18" charset="0"/>
+                  <a:cs typeface="Times New Roman" panose="02020603050405020304" pitchFamily="18" charset="0"/>
+                </a:rPr>
+                <a:t>-2</a:t>
+              </a:r>
+              <a:r>
+                <a:rPr lang="en-US" sz="1100" dirty="0">
+                  <a:latin typeface="Times New Roman" panose="02020603050405020304" pitchFamily="18" charset="0"/>
+                  <a:cs typeface="Times New Roman" panose="02020603050405020304" pitchFamily="18" charset="0"/>
+                </a:rPr>
+                <a:t>)</a:t>
               </a:r>
             </a:p>
           </p:txBody>
@@ -3731,23 +3745,6 @@
 </file>
 
 <file path=customXml/item1.xml><?xml version="1.0" encoding="utf-8"?>
-<p:properties xmlns:p="http://schemas.microsoft.com/office/2006/metadata/properties" xmlns:xsi="http://www.w3.org/2001/XMLSchema-instance" xmlns:pc="http://schemas.microsoft.com/office/infopath/2007/PartnerControls">
-  <documentManagement>
-    <_activity xmlns="95795a71-e404-4875-a540-02ae73fec679" xsi:nil="true"/>
-  </documentManagement>
-</p:properties>
-</file>
-
-<file path=customXml/item2.xml><?xml version="1.0" encoding="utf-8"?>
-<?mso-contentType ?>
-<FormTemplates xmlns="http://schemas.microsoft.com/sharepoint/v3/contenttype/forms">
-  <Display>DocumentLibraryForm</Display>
-  <Edit>DocumentLibraryForm</Edit>
-  <New>DocumentLibraryForm</New>
-</FormTemplates>
-</file>
-
-<file path=customXml/item3.xml><?xml version="1.0" encoding="utf-8"?>
 <ct:contentTypeSchema xmlns:ct="http://schemas.microsoft.com/office/2006/metadata/contentType" xmlns:ma="http://schemas.microsoft.com/office/2006/metadata/properties/metaAttributes" ct:_="" ma:_="" ma:contentTypeName="Document" ma:contentTypeID="0x010100063939A63737AC47B8C69DF635FB413A" ma:contentTypeVersion="18" ma:contentTypeDescription="Create a new document." ma:contentTypeScope="" ma:versionID="3f2a235765a2cd8897205e316b1fe830">
   <xsd:schema xmlns:xsd="http://www.w3.org/2001/XMLSchema" xmlns:xs="http://www.w3.org/2001/XMLSchema" xmlns:p="http://schemas.microsoft.com/office/2006/metadata/properties" xmlns:ns3="95795a71-e404-4875-a540-02ae73fec679" xmlns:ns4="050f8cba-7fe8-4dfb-a19a-871d44564048" targetNamespace="http://schemas.microsoft.com/office/2006/metadata/properties" ma:root="true" ma:fieldsID="54520240dade0c44c3d2c79203a76902" ns3:_="" ns4:_="">
     <xsd:import namespace="95795a71-e404-4875-a540-02ae73fec679"/>
@@ -4000,32 +3997,24 @@
 </ct:contentTypeSchema>
 </file>
 
-<file path=customXml/itemProps1.xml><?xml version="1.0" encoding="utf-8"?>
-<ds:datastoreItem xmlns:ds="http://schemas.openxmlformats.org/officeDocument/2006/customXml" ds:itemID="{B44DE52A-ED12-4387-A128-BD08EB064083}">
-  <ds:schemaRefs>
-    <ds:schemaRef ds:uri="http://schemas.microsoft.com/office/2006/documentManagement/types"/>
-    <ds:schemaRef ds:uri="95795a71-e404-4875-a540-02ae73fec679"/>
-    <ds:schemaRef ds:uri="http://www.w3.org/XML/1998/namespace"/>
-    <ds:schemaRef ds:uri="http://schemas.microsoft.com/office/2006/metadata/properties"/>
-    <ds:schemaRef ds:uri="050f8cba-7fe8-4dfb-a19a-871d44564048"/>
-    <ds:schemaRef ds:uri="http://purl.org/dc/dcmitype/"/>
-    <ds:schemaRef ds:uri="http://purl.org/dc/elements/1.1/"/>
-    <ds:schemaRef ds:uri="http://schemas.microsoft.com/office/infopath/2007/PartnerControls"/>
-    <ds:schemaRef ds:uri="http://schemas.openxmlformats.org/package/2006/metadata/core-properties"/>
-    <ds:schemaRef ds:uri="http://purl.org/dc/terms/"/>
-  </ds:schemaRefs>
-</ds:datastoreItem>
+<file path=customXml/item2.xml><?xml version="1.0" encoding="utf-8"?>
+<?mso-contentType ?>
+<FormTemplates xmlns="http://schemas.microsoft.com/sharepoint/v3/contenttype/forms">
+  <Display>DocumentLibraryForm</Display>
+  <Edit>DocumentLibraryForm</Edit>
+  <New>DocumentLibraryForm</New>
+</FormTemplates>
 </file>
 
-<file path=customXml/itemProps2.xml><?xml version="1.0" encoding="utf-8"?>
-<ds:datastoreItem xmlns:ds="http://schemas.openxmlformats.org/officeDocument/2006/customXml" ds:itemID="{46EC44A2-D96C-4956-A631-1C22B9C98064}">
-  <ds:schemaRefs>
-    <ds:schemaRef ds:uri="http://schemas.microsoft.com/sharepoint/v3/contenttype/forms"/>
-  </ds:schemaRefs>
-</ds:datastoreItem>
+<file path=customXml/item3.xml><?xml version="1.0" encoding="utf-8"?>
+<p:properties xmlns:p="http://schemas.microsoft.com/office/2006/metadata/properties" xmlns:xsi="http://www.w3.org/2001/XMLSchema-instance" xmlns:pc="http://schemas.microsoft.com/office/infopath/2007/PartnerControls">
+  <documentManagement>
+    <_activity xmlns="95795a71-e404-4875-a540-02ae73fec679" xsi:nil="true"/>
+  </documentManagement>
+</p:properties>
 </file>
 
-<file path=customXml/itemProps3.xml><?xml version="1.0" encoding="utf-8"?>
+<file path=customXml/itemProps1.xml><?xml version="1.0" encoding="utf-8"?>
 <ds:datastoreItem xmlns:ds="http://schemas.openxmlformats.org/officeDocument/2006/customXml" ds:itemID="{218150A7-2B05-4602-B3DE-5EC64380C3D8}">
   <ds:schemaRefs>
     <ds:schemaRef ds:uri="http://schemas.microsoft.com/office/2006/metadata/contentType"/>
@@ -4042,4 +4031,29 @@
     <ds:schemaRef ds:uri="http://schemas.microsoft.com/internal/obd"/>
   </ds:schemaRefs>
 </ds:datastoreItem>
+</file>
+
+<file path=customXml/itemProps2.xml><?xml version="1.0" encoding="utf-8"?>
+<ds:datastoreItem xmlns:ds="http://schemas.openxmlformats.org/officeDocument/2006/customXml" ds:itemID="{46EC44A2-D96C-4956-A631-1C22B9C98064}">
+  <ds:schemaRefs>
+    <ds:schemaRef ds:uri="http://schemas.microsoft.com/sharepoint/v3/contenttype/forms"/>
+  </ds:schemaRefs>
+</ds:datastoreItem>
+</file>
+
+<file path=customXml/itemProps3.xml><?xml version="1.0" encoding="utf-8"?>
+<ds:datastoreItem xmlns:ds="http://schemas.openxmlformats.org/officeDocument/2006/customXml" ds:itemID="{B44DE52A-ED12-4387-A128-BD08EB064083}">
+  <ds:schemaRefs>
+    <ds:schemaRef ds:uri="http://schemas.microsoft.com/office/2006/documentManagement/types"/>
+    <ds:schemaRef ds:uri="95795a71-e404-4875-a540-02ae73fec679"/>
+    <ds:schemaRef ds:uri="http://www.w3.org/XML/1998/namespace"/>
+    <ds:schemaRef ds:uri="http://schemas.microsoft.com/office/2006/metadata/properties"/>
+    <ds:schemaRef ds:uri="050f8cba-7fe8-4dfb-a19a-871d44564048"/>
+    <ds:schemaRef ds:uri="http://purl.org/dc/dcmitype/"/>
+    <ds:schemaRef ds:uri="http://purl.org/dc/elements/1.1/"/>
+    <ds:schemaRef ds:uri="http://schemas.microsoft.com/office/infopath/2007/PartnerControls"/>
+    <ds:schemaRef ds:uri="http://schemas.openxmlformats.org/package/2006/metadata/core-properties"/>
+    <ds:schemaRef ds:uri="http://purl.org/dc/terms/"/>
+  </ds:schemaRefs>
+</ds:datastoreItem>
 </file>
</xml_diff>